<commit_message>
gave presentation and updated ppt, pdf version
</commit_message>
<xml_diff>
--- a/python prez.pptx
+++ b/python prez.pptx
@@ -3873,7 +3873,7 @@
             </a:r>
             <a:r>
               <a:rPr lang="en-CA" sz="2000" dirty="0"/>
-              <a:t> for more.</a:t>
+              <a:t>.</a:t>
             </a:r>
           </a:p>
         </p:txBody>
@@ -4150,13 +4150,13 @@
         </p:nvSpPr>
         <p:spPr>
           <a:xfrm>
-            <a:off x="606387" y="1525001"/>
-            <a:ext cx="4272419" cy="4725328"/>
+            <a:off x="606387" y="1525000"/>
+            <a:ext cx="4272419" cy="4969711"/>
           </a:xfrm>
         </p:spPr>
         <p:txBody>
           <a:bodyPr>
-            <a:normAutofit lnSpcReduction="10000"/>
+            <a:normAutofit fontScale="92500" lnSpcReduction="20000"/>
           </a:bodyPr>
           <a:lstStyle/>
           <a:p>
@@ -4207,7 +4207,7 @@
             </a:r>
             <a:r>
               <a:rPr lang="en-US" sz="2000" noProof="1"/>
-              <a:t> of 0.096</a:t>
+              <a:t> of 0.096 – predicting bike availability against latitude and n_POIs</a:t>
             </a:r>
           </a:p>
           <a:p>
@@ -4225,7 +4225,15 @@
               <a:rPr lang="en-US" sz="2000" noProof="1"/>
               <a:t> Latitude and n_POIs do contribute to bike availability but they are by no means the only factors.</a:t>
             </a:r>
-            <a:endParaRPr lang="en-US" sz="2000" b="1" noProof="1"/>
+          </a:p>
+          <a:p>
+            <a:pPr marL="0" indent="0">
+              <a:buNone/>
+            </a:pPr>
+            <a:r>
+              <a:rPr lang="en-US" sz="2000" noProof="1"/>
+              <a:t>model_building.ipynb</a:t>
+            </a:r>
           </a:p>
           <a:p>
             <a:endParaRPr lang="en-US" sz="2000" noProof="1"/>
@@ -4540,11 +4548,25 @@
           <a:p>
             <a:r>
               <a:rPr lang="en-CA" sz="2000" dirty="0"/>
-              <a:t>Classification problem – categorize high and low density / high and low traffic stations and try and predict using other features </a:t>
+              <a:t>Classification problem – categorize high and low density / high and low traffic stations and try and predict using other features in the data.</a:t>
+            </a:r>
+          </a:p>
+          <a:p>
+            <a:r>
+              <a:rPr lang="en-CA" sz="2000" dirty="0"/>
+              <a:t>Use the </a:t>
+            </a:r>
+            <a:r>
+              <a:rPr lang="en-CA" sz="2000" dirty="0" err="1"/>
+              <a:t>n_POIs</a:t>
+            </a:r>
+            <a:r>
+              <a:rPr lang="en-CA" sz="2000" dirty="0"/>
+              <a:t>, bike availability and other features (Yelp distance from venue to bike station) to identify stations that are underserving the area – build more </a:t>
             </a:r>
             <a:r>
               <a:rPr lang="en-CA" sz="2000"/>
-              <a:t>in the data.</a:t>
+              <a:t>bike stations?</a:t>
             </a:r>
             <a:endParaRPr lang="en-US" sz="2000" dirty="0"/>
           </a:p>

</xml_diff>